<commit_message>
object and arrays übungen
</commit_message>
<xml_diff>
--- a/3. CSS/Slides/CSS Transformation&Animation.pptx
+++ b/3. CSS/Slides/CSS Transformation&Animation.pptx
@@ -996,6 +996,90 @@
 </file>
 
 <file path=ppt/notesSlides/notesSlide5.xml><?xml version="1.0" encoding="utf-8"?>
+<p:notes xmlns:a="http://schemas.openxmlformats.org/drawingml/2006/main" xmlns:r="http://schemas.openxmlformats.org/officeDocument/2006/relationships" xmlns:p="http://schemas.openxmlformats.org/presentationml/2006/main">
+  <p:cSld>
+    <p:spTree>
+      <p:nvGrpSpPr>
+        <p:cNvPr id="1" name=""/>
+        <p:cNvGrpSpPr/>
+        <p:nvPr/>
+      </p:nvGrpSpPr>
+      <p:grpSpPr>
+        <a:xfrm>
+          <a:off x="0" y="0"/>
+          <a:ext cx="0" cy="0"/>
+          <a:chOff x="0" y="0"/>
+          <a:chExt cx="0" cy="0"/>
+        </a:xfrm>
+      </p:grpSpPr>
+      <p:sp>
+        <p:nvSpPr>
+          <p:cNvPr id="2" name="Folienbildplatzhalter 1"/>
+          <p:cNvSpPr>
+            <a:spLocks noGrp="1" noRot="1" noChangeAspect="1"/>
+          </p:cNvSpPr>
+          <p:nvPr>
+            <p:ph type="sldImg"/>
+          </p:nvPr>
+        </p:nvSpPr>
+        <p:spPr/>
+      </p:sp>
+      <p:sp>
+        <p:nvSpPr>
+          <p:cNvPr id="3" name="Notizenplatzhalter 2"/>
+          <p:cNvSpPr>
+            <a:spLocks noGrp="1"/>
+          </p:cNvSpPr>
+          <p:nvPr>
+            <p:ph type="body" idx="1"/>
+          </p:nvPr>
+        </p:nvSpPr>
+        <p:spPr/>
+        <p:txBody>
+          <a:bodyPr/>
+          <a:lstStyle/>
+          <a:p>
+            <a:endParaRPr lang="de-AT" dirty="0"/>
+          </a:p>
+        </p:txBody>
+      </p:sp>
+      <p:sp>
+        <p:nvSpPr>
+          <p:cNvPr id="4" name="Foliennummernplatzhalter 3"/>
+          <p:cNvSpPr>
+            <a:spLocks noGrp="1"/>
+          </p:cNvSpPr>
+          <p:nvPr>
+            <p:ph type="sldNum" sz="quarter" idx="5"/>
+          </p:nvPr>
+        </p:nvSpPr>
+        <p:spPr/>
+        <p:txBody>
+          <a:bodyPr/>
+          <a:lstStyle/>
+          <a:p>
+            <a:fld id="{B1598897-9DDC-4E75-B1A7-D1A2AB60BB28}" type="slidenum">
+              <a:rPr lang="de-AT" smtClean="0"/>
+              <a:t>9</a:t>
+            </a:fld>
+            <a:endParaRPr lang="de-AT"/>
+          </a:p>
+        </p:txBody>
+      </p:sp>
+    </p:spTree>
+    <p:extLst>
+      <p:ext uri="{BB962C8B-B14F-4D97-AF65-F5344CB8AC3E}">
+        <p14:creationId xmlns:p14="http://schemas.microsoft.com/office/powerpoint/2010/main" val="4126356527"/>
+      </p:ext>
+    </p:extLst>
+  </p:cSld>
+  <p:clrMapOvr>
+    <a:masterClrMapping/>
+  </p:clrMapOvr>
+</p:notes>
+</file>
+
+<file path=ppt/notesSlides/notesSlide6.xml><?xml version="1.0" encoding="utf-8"?>
 <p:notes xmlns:a="http://schemas.openxmlformats.org/drawingml/2006/main" xmlns:r="http://schemas.openxmlformats.org/officeDocument/2006/relationships" xmlns:p="http://schemas.openxmlformats.org/presentationml/2006/main">
   <p:cSld>
     <p:spTree>
@@ -4979,7 +5063,7 @@
             </a:pPr>
             <a:r>
               <a:rPr lang="de-AT" sz="1600" dirty="0"/>
-              <a:t>Nach 3 Sekunden wechselt es auf Grün</a:t>
+              <a:t>Nach 2 Sekunden wechselt es auf gelb</a:t>
             </a:r>
           </a:p>
           <a:p>
@@ -4988,7 +5072,7 @@
             </a:pPr>
             <a:r>
               <a:rPr lang="de-AT" sz="1600" dirty="0"/>
-              <a:t>Nach 3 Sekunden fängt grün zu blinken an für  2 Sekunden</a:t>
+              <a:t>Nach 2 Sekunden wechselt es auf grün</a:t>
             </a:r>
           </a:p>
           <a:p>
@@ -4997,7 +5081,7 @@
             </a:pPr>
             <a:r>
               <a:rPr lang="de-AT" sz="1600" dirty="0"/>
-              <a:t>Danach wechselt es auf Gelb für 2 Sekunden</a:t>
+              <a:t>Nach 2 Sekunden blinkt es grün für 2 Sekunden</a:t>
             </a:r>
           </a:p>
           <a:p>
@@ -5006,7 +5090,16 @@
             </a:pPr>
             <a:r>
               <a:rPr lang="de-AT" sz="1600" dirty="0"/>
-              <a:t>Danach fängt der Zyklus wieder bei Rot an</a:t>
+              <a:t>Danach wird es gelb für 2 Sekunden</a:t>
+            </a:r>
+          </a:p>
+          <a:p>
+            <a:pPr marL="342900" indent="-342900">
+              <a:buAutoNum type="arabicPeriod"/>
+            </a:pPr>
+            <a:r>
+              <a:rPr lang="de-AT" sz="1600" dirty="0"/>
+              <a:t>Danach fängt der Zyklus von vorne an</a:t>
             </a:r>
           </a:p>
           <a:p>
@@ -5528,6 +5621,67 @@
                                           <p:spTgt spid="3">
                                             <p:txEl>
                                               <p:pRg st="5" end="5"/>
+                                            </p:txEl>
+                                          </p:spTgt>
+                                        </p:tgtEl>
+                                      </p:cBhvr>
+                                    </p:animEffect>
+                                  </p:childTnLst>
+                                </p:cTn>
+                              </p:par>
+                            </p:childTnLst>
+                          </p:cTn>
+                        </p:par>
+                      </p:childTnLst>
+                    </p:cTn>
+                  </p:par>
+                  <p:par>
+                    <p:cTn id="33" fill="hold">
+                      <p:stCondLst>
+                        <p:cond delay="indefinite"/>
+                      </p:stCondLst>
+                      <p:childTnLst>
+                        <p:par>
+                          <p:cTn id="34" fill="hold">
+                            <p:stCondLst>
+                              <p:cond delay="0"/>
+                            </p:stCondLst>
+                            <p:childTnLst>
+                              <p:par>
+                                <p:cTn id="35" presetID="10" presetClass="entr" presetSubtype="0" fill="hold" grpId="0" nodeType="clickEffect">
+                                  <p:stCondLst>
+                                    <p:cond delay="0"/>
+                                  </p:stCondLst>
+                                  <p:childTnLst>
+                                    <p:set>
+                                      <p:cBhvr>
+                                        <p:cTn id="36" dur="1" fill="hold">
+                                          <p:stCondLst>
+                                            <p:cond delay="0"/>
+                                          </p:stCondLst>
+                                        </p:cTn>
+                                        <p:tgtEl>
+                                          <p:spTgt spid="3">
+                                            <p:txEl>
+                                              <p:pRg st="6" end="6"/>
+                                            </p:txEl>
+                                          </p:spTgt>
+                                        </p:tgtEl>
+                                        <p:attrNameLst>
+                                          <p:attrName>style.visibility</p:attrName>
+                                        </p:attrNameLst>
+                                      </p:cBhvr>
+                                      <p:to>
+                                        <p:strVal val="visible"/>
+                                      </p:to>
+                                    </p:set>
+                                    <p:animEffect transition="in" filter="fade">
+                                      <p:cBhvr>
+                                        <p:cTn id="37" dur="500"/>
+                                        <p:tgtEl>
+                                          <p:spTgt spid="3">
+                                            <p:txEl>
+                                              <p:pRg st="6" end="6"/>
                                             </p:txEl>
                                           </p:spTgt>
                                         </p:tgtEl>
@@ -11355,7 +11509,7 @@
           <a:p>
             <a:r>
               <a:rPr lang="en-US" dirty="0">
-                <a:hlinkClick r:id="rId2"/>
+                <a:hlinkClick r:id="rId3"/>
               </a:rPr>
               <a:t>https://www.w3schools.com/css/css3_animations.asp</a:t>
             </a:r>
@@ -11474,7 +11628,7 @@
           <p:nvPr/>
         </p:nvPicPr>
         <p:blipFill>
-          <a:blip r:embed="rId3"/>
+          <a:blip r:embed="rId4"/>
           <a:stretch>
             <a:fillRect/>
           </a:stretch>

</xml_diff>